<commit_message>
- Ajout du fichier FileManagment.java - Ajout du fichier SymptomsFileManagment.java - Ajout du fichier ResultFileManagment.java - Suppression du fichier WriteSymptomToFile.java - Mise à jour du fichier de présentation Presentation projet Symptoms.pptx
</commit_message>
<xml_diff>
--- a/Project02Eclipse/Presentation projet Symptoms.pptx
+++ b/Project02Eclipse/Presentation projet Symptoms.pptx
@@ -110,6 +110,11 @@
       </a:defRPr>
     </a:lvl9pPr>
   </p:defaultTextStyle>
+  <p:extLst>
+    <p:ext uri="{EFAFB233-063F-42B5-8137-9DF3F51BA10A}">
+      <p15:sldGuideLst xmlns:p15="http://schemas.microsoft.com/office/powerpoint/2012/main"/>
+    </p:ext>
+  </p:extLst>
 </p:presentation>
 </file>
 
@@ -244,7 +249,7 @@
           <a:p>
             <a:fld id="{7AA021C9-B68A-4BE2-8A59-E1DB179B0B59}" type="datetimeFigureOut">
               <a:rPr lang="fr-FR" smtClean="0"/>
-              <a:t>25/11/2020</a:t>
+              <a:t>27/11/2020</a:t>
             </a:fld>
             <a:endParaRPr lang="fr-FR"/>
           </a:p>
@@ -414,7 +419,7 @@
           <a:p>
             <a:fld id="{7AA021C9-B68A-4BE2-8A59-E1DB179B0B59}" type="datetimeFigureOut">
               <a:rPr lang="fr-FR" smtClean="0"/>
-              <a:t>25/11/2020</a:t>
+              <a:t>27/11/2020</a:t>
             </a:fld>
             <a:endParaRPr lang="fr-FR"/>
           </a:p>
@@ -594,7 +599,7 @@
           <a:p>
             <a:fld id="{7AA021C9-B68A-4BE2-8A59-E1DB179B0B59}" type="datetimeFigureOut">
               <a:rPr lang="fr-FR" smtClean="0"/>
-              <a:t>25/11/2020</a:t>
+              <a:t>27/11/2020</a:t>
             </a:fld>
             <a:endParaRPr lang="fr-FR"/>
           </a:p>
@@ -764,7 +769,7 @@
           <a:p>
             <a:fld id="{7AA021C9-B68A-4BE2-8A59-E1DB179B0B59}" type="datetimeFigureOut">
               <a:rPr lang="fr-FR" smtClean="0"/>
-              <a:t>25/11/2020</a:t>
+              <a:t>27/11/2020</a:t>
             </a:fld>
             <a:endParaRPr lang="fr-FR"/>
           </a:p>
@@ -1010,7 +1015,7 @@
           <a:p>
             <a:fld id="{7AA021C9-B68A-4BE2-8A59-E1DB179B0B59}" type="datetimeFigureOut">
               <a:rPr lang="fr-FR" smtClean="0"/>
-              <a:t>25/11/2020</a:t>
+              <a:t>27/11/2020</a:t>
             </a:fld>
             <a:endParaRPr lang="fr-FR"/>
           </a:p>
@@ -1242,7 +1247,7 @@
           <a:p>
             <a:fld id="{7AA021C9-B68A-4BE2-8A59-E1DB179B0B59}" type="datetimeFigureOut">
               <a:rPr lang="fr-FR" smtClean="0"/>
-              <a:t>25/11/2020</a:t>
+              <a:t>27/11/2020</a:t>
             </a:fld>
             <a:endParaRPr lang="fr-FR"/>
           </a:p>
@@ -1609,7 +1614,7 @@
           <a:p>
             <a:fld id="{7AA021C9-B68A-4BE2-8A59-E1DB179B0B59}" type="datetimeFigureOut">
               <a:rPr lang="fr-FR" smtClean="0"/>
-              <a:t>25/11/2020</a:t>
+              <a:t>27/11/2020</a:t>
             </a:fld>
             <a:endParaRPr lang="fr-FR"/>
           </a:p>
@@ -1727,7 +1732,7 @@
           <a:p>
             <a:fld id="{7AA021C9-B68A-4BE2-8A59-E1DB179B0B59}" type="datetimeFigureOut">
               <a:rPr lang="fr-FR" smtClean="0"/>
-              <a:t>25/11/2020</a:t>
+              <a:t>27/11/2020</a:t>
             </a:fld>
             <a:endParaRPr lang="fr-FR"/>
           </a:p>
@@ -1822,7 +1827,7 @@
           <a:p>
             <a:fld id="{7AA021C9-B68A-4BE2-8A59-E1DB179B0B59}" type="datetimeFigureOut">
               <a:rPr lang="fr-FR" smtClean="0"/>
-              <a:t>25/11/2020</a:t>
+              <a:t>27/11/2020</a:t>
             </a:fld>
             <a:endParaRPr lang="fr-FR"/>
           </a:p>
@@ -2099,7 +2104,7 @@
           <a:p>
             <a:fld id="{7AA021C9-B68A-4BE2-8A59-E1DB179B0B59}" type="datetimeFigureOut">
               <a:rPr lang="fr-FR" smtClean="0"/>
-              <a:t>25/11/2020</a:t>
+              <a:t>27/11/2020</a:t>
             </a:fld>
             <a:endParaRPr lang="fr-FR"/>
           </a:p>
@@ -2352,7 +2357,7 @@
           <a:p>
             <a:fld id="{7AA021C9-B68A-4BE2-8A59-E1DB179B0B59}" type="datetimeFigureOut">
               <a:rPr lang="fr-FR" smtClean="0"/>
-              <a:t>25/11/2020</a:t>
+              <a:t>27/11/2020</a:t>
             </a:fld>
             <a:endParaRPr lang="fr-FR"/>
           </a:p>
@@ -2595,7 +2600,7 @@
           <a:p>
             <a:fld id="{7AA021C9-B68A-4BE2-8A59-E1DB179B0B59}" type="datetimeFigureOut">
               <a:rPr lang="fr-FR" smtClean="0"/>
-              <a:t>25/11/2020</a:t>
+              <a:t>27/11/2020</a:t>
             </a:fld>
             <a:endParaRPr lang="fr-FR"/>
           </a:p>
@@ -3732,25 +3737,82 @@
         </p:nvSpPr>
         <p:spPr/>
         <p:txBody>
-          <a:bodyPr/>
-          <a:lstStyle/>
-          <a:p>
-            <a:r>
-              <a:rPr lang="fr-FR" dirty="0" smtClean="0"/>
-              <a:t>Le traitement est décomposé en trois classes :</a:t>
+          <a:bodyPr>
+            <a:normAutofit fontScale="77500" lnSpcReduction="20000"/>
+          </a:bodyPr>
+          <a:lstStyle/>
+          <a:p>
+            <a:r>
+              <a:rPr lang="fr-FR" dirty="0" smtClean="0"/>
+              <a:t>Le traitement est décomposé en trois </a:t>
+            </a:r>
+            <a:r>
+              <a:rPr lang="fr-FR" dirty="0" smtClean="0"/>
+              <a:t>classes et deux interfaces :</a:t>
             </a:r>
           </a:p>
           <a:p>
             <a:pPr lvl="1"/>
             <a:r>
               <a:rPr lang="fr-FR" dirty="0" smtClean="0"/>
-              <a:t>Une classe pour :</a:t>
+              <a:t>Une classe principale (</a:t>
+            </a:r>
+            <a:r>
+              <a:rPr lang="fr-FR" dirty="0" err="1" smtClean="0"/>
+              <a:t>FileManagment</a:t>
+            </a:r>
+            <a:r>
+              <a:rPr lang="fr-FR" dirty="0" smtClean="0"/>
+              <a:t>) pour la gestion de fichier :</a:t>
             </a:r>
           </a:p>
           <a:p>
             <a:pPr lvl="2"/>
             <a:r>
               <a:rPr lang="fr-FR" dirty="0" smtClean="0"/>
+              <a:t>Définition du répertoire où se trouvent les fichiers « symptoms.txt » et « </a:t>
+            </a:r>
+            <a:r>
+              <a:rPr lang="fr-FR" dirty="0" err="1" smtClean="0"/>
+              <a:t>results.out</a:t>
+            </a:r>
+            <a:r>
+              <a:rPr lang="fr-FR" dirty="0" smtClean="0"/>
+              <a:t> »</a:t>
+            </a:r>
+            <a:endParaRPr lang="fr-FR" dirty="0" smtClean="0"/>
+          </a:p>
+          <a:p>
+            <a:pPr lvl="1"/>
+            <a:r>
+              <a:rPr lang="fr-FR" dirty="0" smtClean="0"/>
+              <a:t>Une </a:t>
+            </a:r>
+            <a:r>
+              <a:rPr lang="fr-FR" dirty="0"/>
+              <a:t>classe (</a:t>
+            </a:r>
+            <a:r>
+              <a:rPr lang="fr-FR" dirty="0" err="1" smtClean="0"/>
+              <a:t>SymptomsFileManagment</a:t>
+            </a:r>
+            <a:r>
+              <a:rPr lang="fr-FR" dirty="0" smtClean="0"/>
+              <a:t>) qui hérite de la classe principale </a:t>
+            </a:r>
+            <a:r>
+              <a:rPr lang="fr-FR" dirty="0" smtClean="0"/>
+              <a:t>pour </a:t>
+            </a:r>
+            <a:r>
+              <a:rPr lang="fr-FR" dirty="0" smtClean="0"/>
+              <a:t>:</a:t>
+            </a:r>
+          </a:p>
+          <a:p>
+            <a:pPr lvl="2"/>
+            <a:r>
+              <a:rPr lang="fr-FR" dirty="0" smtClean="0"/>
               <a:t>L’ouverture du fichier d’entrée </a:t>
             </a:r>
           </a:p>
@@ -3765,7 +3827,23 @@
             <a:pPr lvl="1"/>
             <a:r>
               <a:rPr lang="fr-FR" dirty="0" smtClean="0"/>
-              <a:t>Une classe pour :</a:t>
+              <a:t>Une </a:t>
+            </a:r>
+            <a:r>
+              <a:rPr lang="fr-FR" dirty="0"/>
+              <a:t>classe (</a:t>
+            </a:r>
+            <a:r>
+              <a:rPr lang="fr-FR" dirty="0" err="1" smtClean="0"/>
+              <a:t>ResultFileManagment</a:t>
+            </a:r>
+            <a:r>
+              <a:rPr lang="fr-FR" dirty="0" smtClean="0"/>
+              <a:t>) qui hérite de la classe principale </a:t>
+            </a:r>
+            <a:r>
+              <a:rPr lang="fr-FR" dirty="0" smtClean="0"/>
+              <a:t>pour :</a:t>
             </a:r>
           </a:p>
           <a:p>
@@ -3783,25 +3861,38 @@
             <a:pPr lvl="2"/>
             <a:r>
               <a:rPr lang="fr-FR" dirty="0" smtClean="0"/>
-              <a:t>L’écriture des données de sortie</a:t>
+              <a:t>L’écriture des données de </a:t>
+            </a:r>
+            <a:r>
+              <a:rPr lang="fr-FR" dirty="0" smtClean="0"/>
+              <a:t>sortie par une </a:t>
+            </a:r>
+            <a:r>
+              <a:rPr lang="fr-FR" dirty="0"/>
+              <a:t>boucle sur le dictionnaire qui permet d’écrire les données présentes dans celui-ci à l’intérieur du fichier de sortie</a:t>
             </a:r>
           </a:p>
           <a:p>
             <a:pPr lvl="2"/>
-            <a:r>
-              <a:rPr lang="fr-FR" dirty="0" smtClean="0"/>
-              <a:t>La fermeture du fichier de sortie</a:t>
-            </a:r>
+            <a:endParaRPr lang="fr-FR" dirty="0" smtClean="0"/>
           </a:p>
           <a:p>
             <a:pPr lvl="1"/>
             <a:r>
-              <a:rPr lang="fr-FR" dirty="0" smtClean="0"/>
-              <a:t>Une classe pour le traitement des données : </a:t>
-            </a:r>
-            <a:r>
-              <a:rPr lang="fr-FR" dirty="0" smtClean="0"/>
-              <a:t>	</a:t>
+              <a:rPr lang="fr-FR" dirty="0"/>
+              <a:t>Une classe (</a:t>
+            </a:r>
+            <a:r>
+              <a:rPr lang="fr-FR" dirty="0" err="1" smtClean="0"/>
+              <a:t>SymptomsTreatment</a:t>
+            </a:r>
+            <a:r>
+              <a:rPr lang="fr-FR" dirty="0" smtClean="0"/>
+              <a:t>) </a:t>
+            </a:r>
+            <a:r>
+              <a:rPr lang="fr-FR" dirty="0" smtClean="0"/>
+              <a:t>pour le traitement des données : 	</a:t>
             </a:r>
           </a:p>
           <a:p>
@@ -3815,7 +3906,54 @@
             <a:pPr lvl="2"/>
             <a:r>
               <a:rPr lang="fr-FR" dirty="0" smtClean="0"/>
-              <a:t>Comptage des symptômes</a:t>
+              <a:t>Comptage des </a:t>
+            </a:r>
+            <a:r>
+              <a:rPr lang="fr-FR" dirty="0" smtClean="0"/>
+              <a:t>symptômes</a:t>
+            </a:r>
+          </a:p>
+          <a:p>
+            <a:pPr lvl="1"/>
+            <a:r>
+              <a:rPr lang="fr-FR" dirty="0" smtClean="0"/>
+              <a:t>Une </a:t>
+            </a:r>
+            <a:r>
+              <a:rPr lang="fr-FR" dirty="0"/>
+              <a:t>interface (</a:t>
+            </a:r>
+            <a:r>
+              <a:rPr lang="fr-FR" dirty="0" err="1" smtClean="0"/>
+              <a:t>ISymptomReader</a:t>
+            </a:r>
+            <a:r>
+              <a:rPr lang="fr-FR" dirty="0" smtClean="0"/>
+              <a:t>) représente le contrat avec la classe </a:t>
+            </a:r>
+            <a:r>
+              <a:rPr lang="fr-FR" dirty="0" err="1" smtClean="0"/>
+              <a:t>SymptomsFileManagment</a:t>
+            </a:r>
+            <a:endParaRPr lang="fr-FR" dirty="0" smtClean="0"/>
+          </a:p>
+          <a:p>
+            <a:pPr lvl="1"/>
+            <a:r>
+              <a:rPr lang="fr-FR" dirty="0"/>
+              <a:t>Une interface (</a:t>
+            </a:r>
+            <a:r>
+              <a:rPr lang="fr-FR" dirty="0" err="1" smtClean="0"/>
+              <a:t>IsSymptomeWriter</a:t>
+            </a:r>
+            <a:r>
+              <a:rPr lang="fr-FR" dirty="0" smtClean="0"/>
+              <a:t>) représente le contrat avec la classe </a:t>
+            </a:r>
+            <a:r>
+              <a:rPr lang="fr-FR" dirty="0" err="1"/>
+              <a:t>ResultFileManagment</a:t>
             </a:r>
             <a:endParaRPr lang="fr-FR" dirty="0"/>
           </a:p>
@@ -3920,16 +4058,13 @@
             <a:pPr lvl="2"/>
             <a:r>
               <a:rPr lang="fr-FR" dirty="0" smtClean="0"/>
-              <a:t>De placer le symptôme et le nombre d’occurrences dans le dictionnaire</a:t>
-            </a:r>
-          </a:p>
-          <a:p>
-            <a:pPr lvl="1"/>
-            <a:r>
-              <a:rPr lang="fr-FR" dirty="0" smtClean="0"/>
-              <a:t>Une boucle sur le dictionnaire qui permet d’écrire les données présentes dans celui-ci à l’intérieur du fichier de sortie</a:t>
-            </a:r>
-            <a:endParaRPr lang="fr-FR" dirty="0"/>
+              <a:t>De placer le symptôme et le nombre d’occurrences dans le </a:t>
+            </a:r>
+            <a:r>
+              <a:rPr lang="fr-FR" dirty="0" smtClean="0"/>
+              <a:t>dictionnaire</a:t>
+            </a:r>
+            <a:endParaRPr lang="fr-FR" dirty="0" smtClean="0"/>
           </a:p>
         </p:txBody>
       </p:sp>

</xml_diff>